<commit_message>
add markdown format as Page
</commit_message>
<xml_diff>
--- a/design/xlang_icon.pptx
+++ b/design/xlang_icon.pptx
@@ -259,7 +259,7 @@
           <a:p>
             <a:fld id="{B18F1FCF-5840-4F78-ACE1-697B94E8CC1D}" type="datetimeFigureOut">
               <a:rPr lang="en-US" smtClean="0"/>
-              <a:t>1/23/2023</a:t>
+              <a:t>2/25/2023</a:t>
             </a:fld>
             <a:endParaRPr lang="en-US"/>
           </a:p>
@@ -457,7 +457,7 @@
           <a:p>
             <a:fld id="{B18F1FCF-5840-4F78-ACE1-697B94E8CC1D}" type="datetimeFigureOut">
               <a:rPr lang="en-US" smtClean="0"/>
-              <a:t>1/23/2023</a:t>
+              <a:t>2/25/2023</a:t>
             </a:fld>
             <a:endParaRPr lang="en-US"/>
           </a:p>
@@ -665,7 +665,7 @@
           <a:p>
             <a:fld id="{B18F1FCF-5840-4F78-ACE1-697B94E8CC1D}" type="datetimeFigureOut">
               <a:rPr lang="en-US" smtClean="0"/>
-              <a:t>1/23/2023</a:t>
+              <a:t>2/25/2023</a:t>
             </a:fld>
             <a:endParaRPr lang="en-US"/>
           </a:p>
@@ -863,7 +863,7 @@
           <a:p>
             <a:fld id="{B18F1FCF-5840-4F78-ACE1-697B94E8CC1D}" type="datetimeFigureOut">
               <a:rPr lang="en-US" smtClean="0"/>
-              <a:t>1/23/2023</a:t>
+              <a:t>2/25/2023</a:t>
             </a:fld>
             <a:endParaRPr lang="en-US"/>
           </a:p>
@@ -1138,7 +1138,7 @@
           <a:p>
             <a:fld id="{B18F1FCF-5840-4F78-ACE1-697B94E8CC1D}" type="datetimeFigureOut">
               <a:rPr lang="en-US" smtClean="0"/>
-              <a:t>1/23/2023</a:t>
+              <a:t>2/25/2023</a:t>
             </a:fld>
             <a:endParaRPr lang="en-US"/>
           </a:p>
@@ -1403,7 +1403,7 @@
           <a:p>
             <a:fld id="{B18F1FCF-5840-4F78-ACE1-697B94E8CC1D}" type="datetimeFigureOut">
               <a:rPr lang="en-US" smtClean="0"/>
-              <a:t>1/23/2023</a:t>
+              <a:t>2/25/2023</a:t>
             </a:fld>
             <a:endParaRPr lang="en-US"/>
           </a:p>
@@ -1815,7 +1815,7 @@
           <a:p>
             <a:fld id="{B18F1FCF-5840-4F78-ACE1-697B94E8CC1D}" type="datetimeFigureOut">
               <a:rPr lang="en-US" smtClean="0"/>
-              <a:t>1/23/2023</a:t>
+              <a:t>2/25/2023</a:t>
             </a:fld>
             <a:endParaRPr lang="en-US"/>
           </a:p>
@@ -1956,7 +1956,7 @@
           <a:p>
             <a:fld id="{B18F1FCF-5840-4F78-ACE1-697B94E8CC1D}" type="datetimeFigureOut">
               <a:rPr lang="en-US" smtClean="0"/>
-              <a:t>1/23/2023</a:t>
+              <a:t>2/25/2023</a:t>
             </a:fld>
             <a:endParaRPr lang="en-US"/>
           </a:p>
@@ -2069,7 +2069,7 @@
           <a:p>
             <a:fld id="{B18F1FCF-5840-4F78-ACE1-697B94E8CC1D}" type="datetimeFigureOut">
               <a:rPr lang="en-US" smtClean="0"/>
-              <a:t>1/23/2023</a:t>
+              <a:t>2/25/2023</a:t>
             </a:fld>
             <a:endParaRPr lang="en-US"/>
           </a:p>
@@ -2380,7 +2380,7 @@
           <a:p>
             <a:fld id="{B18F1FCF-5840-4F78-ACE1-697B94E8CC1D}" type="datetimeFigureOut">
               <a:rPr lang="en-US" smtClean="0"/>
-              <a:t>1/23/2023</a:t>
+              <a:t>2/25/2023</a:t>
             </a:fld>
             <a:endParaRPr lang="en-US"/>
           </a:p>
@@ -2668,7 +2668,7 @@
           <a:p>
             <a:fld id="{B18F1FCF-5840-4F78-ACE1-697B94E8CC1D}" type="datetimeFigureOut">
               <a:rPr lang="en-US" smtClean="0"/>
-              <a:t>1/23/2023</a:t>
+              <a:t>2/25/2023</a:t>
             </a:fld>
             <a:endParaRPr lang="en-US"/>
           </a:p>
@@ -2909,7 +2909,7 @@
           <a:p>
             <a:fld id="{B18F1FCF-5840-4F78-ACE1-697B94E8CC1D}" type="datetimeFigureOut">
               <a:rPr lang="en-US" smtClean="0"/>
-              <a:t>1/23/2023</a:t>
+              <a:t>2/25/2023</a:t>
             </a:fld>
             <a:endParaRPr lang="en-US"/>
           </a:p>
@@ -3340,10 +3340,10 @@
         </p:nvGrpSpPr>
         <p:grpSpPr>
           <a:xfrm>
-            <a:off x="3339763" y="2060303"/>
-            <a:ext cx="887854" cy="470599"/>
-            <a:chOff x="3311550" y="2060306"/>
-            <a:chExt cx="1151428" cy="579220"/>
+            <a:off x="3281563" y="1849057"/>
+            <a:ext cx="724730" cy="622115"/>
+            <a:chOff x="3236072" y="2059859"/>
+            <a:chExt cx="939878" cy="526886"/>
           </a:xfrm>
         </p:grpSpPr>
         <p:sp>
@@ -3360,8 +3360,8 @@
           </p:nvSpPr>
           <p:spPr>
             <a:xfrm>
-              <a:off x="3311550" y="2276266"/>
-              <a:ext cx="1028187" cy="363260"/>
+              <a:off x="3236072" y="2273948"/>
+              <a:ext cx="604462" cy="312797"/>
             </a:xfrm>
             <a:prstGeom prst="rect">
               <a:avLst/>
@@ -3444,7 +3444,7 @@
           </p:nvSpPr>
           <p:spPr>
             <a:xfrm>
-              <a:off x="3550931" y="2161879"/>
+              <a:off x="3380239" y="2135461"/>
               <a:ext cx="246479" cy="114387"/>
             </a:xfrm>
             <a:prstGeom prst="roundRect">
@@ -3496,7 +3496,7 @@
           </p:nvSpPr>
           <p:spPr>
             <a:xfrm>
-              <a:off x="3883715" y="2060306"/>
+              <a:off x="3760475" y="2059859"/>
               <a:ext cx="246479" cy="114387"/>
             </a:xfrm>
             <a:prstGeom prst="roundRect">
@@ -3548,7 +3548,7 @@
           </p:nvSpPr>
           <p:spPr>
             <a:xfrm>
-              <a:off x="4216499" y="2146026"/>
+              <a:off x="3929471" y="2216754"/>
               <a:ext cx="246479" cy="114387"/>
             </a:xfrm>
             <a:prstGeom prst="roundRect">
@@ -3583,50 +3583,42 @@
       </p:grpSp>
       <p:sp>
         <p:nvSpPr>
-          <p:cNvPr id="9" name="Oval 8">
-            <a:extLst>
-              <a:ext uri="{FF2B5EF4-FFF2-40B4-BE49-F238E27FC236}">
-                <a16:creationId xmlns:a16="http://schemas.microsoft.com/office/drawing/2014/main" id="{180A7431-5528-BE61-FFDB-A6C174286FEA}"/>
-              </a:ext>
-            </a:extLst>
-          </p:cNvPr>
-          <p:cNvSpPr/>
+          <p:cNvPr id="3" name="TextBox 2">
+            <a:extLst>
+              <a:ext uri="{FF2B5EF4-FFF2-40B4-BE49-F238E27FC236}">
+                <a16:creationId xmlns:a16="http://schemas.microsoft.com/office/drawing/2014/main" id="{5CBF20BA-7E21-30FC-91AC-66E76CFD9F96}"/>
+              </a:ext>
+            </a:extLst>
+          </p:cNvPr>
+          <p:cNvSpPr txBox="1"/>
           <p:nvPr/>
         </p:nvSpPr>
         <p:spPr>
           <a:xfrm>
-            <a:off x="3714404" y="2354213"/>
-            <a:ext cx="66549" cy="45719"/>
+            <a:off x="3685922" y="2133169"/>
+            <a:ext cx="579005" cy="369332"/>
           </a:xfrm>
-          <a:prstGeom prst="ellipse">
+          <a:prstGeom prst="rect">
             <a:avLst/>
           </a:prstGeom>
-          <a:solidFill>
-            <a:srgbClr val="FF0000"/>
-          </a:solidFill>
+          <a:noFill/>
         </p:spPr>
-        <p:style>
-          <a:lnRef idx="2">
-            <a:schemeClr val="accent1">
-              <a:shade val="50000"/>
-            </a:schemeClr>
-          </a:lnRef>
-          <a:fillRef idx="1">
-            <a:schemeClr val="accent1"/>
-          </a:fillRef>
-          <a:effectRef idx="0">
-            <a:schemeClr val="accent1"/>
-          </a:effectRef>
-          <a:fontRef idx="minor">
-            <a:schemeClr val="lt1"/>
-          </a:fontRef>
-        </p:style>
-        <p:txBody>
-          <a:bodyPr rtlCol="0" anchor="ctr"/>
-          <a:lstStyle/>
-          <a:p>
-            <a:pPr algn="ctr"/>
-            <a:endParaRPr lang="en-US"/>
+        <p:txBody>
+          <a:bodyPr wrap="none" rtlCol="0">
+            <a:spAutoFit/>
+          </a:bodyPr>
+          <a:lstStyle/>
+          <a:p>
+            <a:r>
+              <a:rPr lang="en-US" dirty="0">
+                <a:solidFill>
+                  <a:schemeClr val="accent6">
+                    <a:lumMod val="75000"/>
+                  </a:schemeClr>
+                </a:solidFill>
+              </a:rPr>
+              <a:t>lang</a:t>
+            </a:r>
           </a:p>
         </p:txBody>
       </p:sp>

</xml_diff>